<commit_message>
Fix conect album user
</commit_message>
<xml_diff>
--- a/발표자료/아키텍처.pptx
+++ b/발표자료/아키텍처.pptx
@@ -4,6 +4,9 @@
   <p:sldMasterIdLst>
     <p:sldMasterId id="2147483648" r:id="rId1"/>
   </p:sldMasterIdLst>
+  <p:notesMasterIdLst>
+    <p:notesMasterId r:id="rId3"/>
+  </p:notesMasterIdLst>
   <p:sldIdLst>
     <p:sldId id="256" r:id="rId2"/>
   </p:sldIdLst>
@@ -112,6 +115,440 @@
 </p:presentation>
 </file>
 
+<file path=ppt/notesMasters/notesMaster1.xml><?xml version="1.0" encoding="utf-8"?>
+<p:notesMaster xmlns:a="http://schemas.openxmlformats.org/drawingml/2006/main" xmlns:r="http://schemas.openxmlformats.org/officeDocument/2006/relationships" xmlns:p="http://schemas.openxmlformats.org/presentationml/2006/main">
+  <p:cSld>
+    <p:bg>
+      <p:bgRef idx="1001">
+        <a:schemeClr val="bg1"/>
+      </p:bgRef>
+    </p:bg>
+    <p:spTree>
+      <p:nvGrpSpPr>
+        <p:cNvPr id="1" name=""/>
+        <p:cNvGrpSpPr/>
+        <p:nvPr/>
+      </p:nvGrpSpPr>
+      <p:grpSpPr>
+        <a:xfrm>
+          <a:off x="0" y="0"/>
+          <a:ext cx="0" cy="0"/>
+          <a:chOff x="0" y="0"/>
+          <a:chExt cx="0" cy="0"/>
+        </a:xfrm>
+      </p:grpSpPr>
+      <p:sp>
+        <p:nvSpPr>
+          <p:cNvPr id="2" name="머리글 개체 틀 1"/>
+          <p:cNvSpPr>
+            <a:spLocks noGrp="1"/>
+          </p:cNvSpPr>
+          <p:nvPr>
+            <p:ph type="hdr" sz="quarter"/>
+          </p:nvPr>
+        </p:nvSpPr>
+        <p:spPr>
+          <a:xfrm>
+            <a:off x="0" y="0"/>
+            <a:ext cx="2971800" cy="458788"/>
+          </a:xfrm>
+          <a:prstGeom prst="rect">
+            <a:avLst/>
+          </a:prstGeom>
+        </p:spPr>
+        <p:txBody>
+          <a:bodyPr vert="horz" lIns="91440" tIns="45720" rIns="91440" bIns="45720" rtlCol="0"/>
+          <a:lstStyle>
+            <a:lvl1pPr algn="l">
+              <a:defRPr sz="1200"/>
+            </a:lvl1pPr>
+          </a:lstStyle>
+          <a:p>
+            <a:endParaRPr lang="ko-KR" altLang="en-US"/>
+          </a:p>
+        </p:txBody>
+      </p:sp>
+      <p:sp>
+        <p:nvSpPr>
+          <p:cNvPr id="3" name="날짜 개체 틀 2"/>
+          <p:cNvSpPr>
+            <a:spLocks noGrp="1"/>
+          </p:cNvSpPr>
+          <p:nvPr>
+            <p:ph type="dt" idx="1"/>
+          </p:nvPr>
+        </p:nvSpPr>
+        <p:spPr>
+          <a:xfrm>
+            <a:off x="3884613" y="0"/>
+            <a:ext cx="2971800" cy="458788"/>
+          </a:xfrm>
+          <a:prstGeom prst="rect">
+            <a:avLst/>
+          </a:prstGeom>
+        </p:spPr>
+        <p:txBody>
+          <a:bodyPr vert="horz" lIns="91440" tIns="45720" rIns="91440" bIns="45720" rtlCol="0"/>
+          <a:lstStyle>
+            <a:lvl1pPr algn="r">
+              <a:defRPr sz="1200"/>
+            </a:lvl1pPr>
+          </a:lstStyle>
+          <a:p>
+            <a:fld id="{CA4581C4-6F68-404E-8218-E97C5DA4EBF3}" type="datetimeFigureOut">
+              <a:rPr lang="ko-KR" altLang="en-US" smtClean="0"/>
+              <a:t>2020-06-08</a:t>
+            </a:fld>
+            <a:endParaRPr lang="ko-KR" altLang="en-US"/>
+          </a:p>
+        </p:txBody>
+      </p:sp>
+      <p:sp>
+        <p:nvSpPr>
+          <p:cNvPr id="4" name="슬라이드 이미지 개체 틀 3"/>
+          <p:cNvSpPr>
+            <a:spLocks noGrp="1" noRot="1" noChangeAspect="1"/>
+          </p:cNvSpPr>
+          <p:nvPr>
+            <p:ph type="sldImg" idx="2"/>
+          </p:nvPr>
+        </p:nvSpPr>
+        <p:spPr>
+          <a:xfrm>
+            <a:off x="685800" y="1143000"/>
+            <a:ext cx="5486400" cy="3086100"/>
+          </a:xfrm>
+          <a:prstGeom prst="rect">
+            <a:avLst/>
+          </a:prstGeom>
+          <a:noFill/>
+          <a:ln w="12700">
+            <a:solidFill>
+              <a:prstClr val="black"/>
+            </a:solidFill>
+          </a:ln>
+        </p:spPr>
+        <p:txBody>
+          <a:bodyPr vert="horz" lIns="91440" tIns="45720" rIns="91440" bIns="45720" rtlCol="0" anchor="ctr"/>
+          <a:lstStyle/>
+          <a:p>
+            <a:endParaRPr lang="ko-KR" altLang="en-US"/>
+          </a:p>
+        </p:txBody>
+      </p:sp>
+      <p:sp>
+        <p:nvSpPr>
+          <p:cNvPr id="5" name="슬라이드 노트 개체 틀 4"/>
+          <p:cNvSpPr>
+            <a:spLocks noGrp="1"/>
+          </p:cNvSpPr>
+          <p:nvPr>
+            <p:ph type="body" sz="quarter" idx="3"/>
+          </p:nvPr>
+        </p:nvSpPr>
+        <p:spPr>
+          <a:xfrm>
+            <a:off x="685800" y="4400550"/>
+            <a:ext cx="5486400" cy="3600450"/>
+          </a:xfrm>
+          <a:prstGeom prst="rect">
+            <a:avLst/>
+          </a:prstGeom>
+        </p:spPr>
+        <p:txBody>
+          <a:bodyPr vert="horz" lIns="91440" tIns="45720" rIns="91440" bIns="45720" rtlCol="0"/>
+          <a:lstStyle/>
+          <a:p>
+            <a:pPr lvl="0"/>
+            <a:r>
+              <a:rPr lang="ko-KR" altLang="en-US" smtClean="0"/>
+              <a:t>마스터 텍스트 스타일 편집</a:t>
+            </a:r>
+          </a:p>
+          <a:p>
+            <a:pPr lvl="1"/>
+            <a:r>
+              <a:rPr lang="ko-KR" altLang="en-US" smtClean="0"/>
+              <a:t>둘째 수준</a:t>
+            </a:r>
+          </a:p>
+          <a:p>
+            <a:pPr lvl="2"/>
+            <a:r>
+              <a:rPr lang="ko-KR" altLang="en-US" smtClean="0"/>
+              <a:t>셋째 수준</a:t>
+            </a:r>
+          </a:p>
+          <a:p>
+            <a:pPr lvl="3"/>
+            <a:r>
+              <a:rPr lang="ko-KR" altLang="en-US" smtClean="0"/>
+              <a:t>넷째 수준</a:t>
+            </a:r>
+          </a:p>
+          <a:p>
+            <a:pPr lvl="4"/>
+            <a:r>
+              <a:rPr lang="ko-KR" altLang="en-US" smtClean="0"/>
+              <a:t>다섯째 수준</a:t>
+            </a:r>
+            <a:endParaRPr lang="ko-KR" altLang="en-US"/>
+          </a:p>
+        </p:txBody>
+      </p:sp>
+      <p:sp>
+        <p:nvSpPr>
+          <p:cNvPr id="6" name="바닥글 개체 틀 5"/>
+          <p:cNvSpPr>
+            <a:spLocks noGrp="1"/>
+          </p:cNvSpPr>
+          <p:nvPr>
+            <p:ph type="ftr" sz="quarter" idx="4"/>
+          </p:nvPr>
+        </p:nvSpPr>
+        <p:spPr>
+          <a:xfrm>
+            <a:off x="0" y="8685213"/>
+            <a:ext cx="2971800" cy="458787"/>
+          </a:xfrm>
+          <a:prstGeom prst="rect">
+            <a:avLst/>
+          </a:prstGeom>
+        </p:spPr>
+        <p:txBody>
+          <a:bodyPr vert="horz" lIns="91440" tIns="45720" rIns="91440" bIns="45720" rtlCol="0" anchor="b"/>
+          <a:lstStyle>
+            <a:lvl1pPr algn="l">
+              <a:defRPr sz="1200"/>
+            </a:lvl1pPr>
+          </a:lstStyle>
+          <a:p>
+            <a:endParaRPr lang="ko-KR" altLang="en-US"/>
+          </a:p>
+        </p:txBody>
+      </p:sp>
+      <p:sp>
+        <p:nvSpPr>
+          <p:cNvPr id="7" name="슬라이드 번호 개체 틀 6"/>
+          <p:cNvSpPr>
+            <a:spLocks noGrp="1"/>
+          </p:cNvSpPr>
+          <p:nvPr>
+            <p:ph type="sldNum" sz="quarter" idx="5"/>
+          </p:nvPr>
+        </p:nvSpPr>
+        <p:spPr>
+          <a:xfrm>
+            <a:off x="3884613" y="8685213"/>
+            <a:ext cx="2971800" cy="458787"/>
+          </a:xfrm>
+          <a:prstGeom prst="rect">
+            <a:avLst/>
+          </a:prstGeom>
+        </p:spPr>
+        <p:txBody>
+          <a:bodyPr vert="horz" lIns="91440" tIns="45720" rIns="91440" bIns="45720" rtlCol="0" anchor="b"/>
+          <a:lstStyle>
+            <a:lvl1pPr algn="r">
+              <a:defRPr sz="1200"/>
+            </a:lvl1pPr>
+          </a:lstStyle>
+          <a:p>
+            <a:fld id="{72F17EC9-D261-4876-B456-23D0954C1B42}" type="slidenum">
+              <a:rPr lang="ko-KR" altLang="en-US" smtClean="0"/>
+              <a:t>‹#›</a:t>
+            </a:fld>
+            <a:endParaRPr lang="ko-KR" altLang="en-US"/>
+          </a:p>
+        </p:txBody>
+      </p:sp>
+    </p:spTree>
+    <p:extLst>
+      <p:ext uri="{BB962C8B-B14F-4D97-AF65-F5344CB8AC3E}">
+        <p14:creationId xmlns:p14="http://schemas.microsoft.com/office/powerpoint/2010/main" val="3920015829"/>
+      </p:ext>
+    </p:extLst>
+  </p:cSld>
+  <p:clrMap bg1="lt1" tx1="dk1" bg2="lt2" tx2="dk2" accent1="accent1" accent2="accent2" accent3="accent3" accent4="accent4" accent5="accent5" accent6="accent6" hlink="hlink" folHlink="folHlink"/>
+  <p:notesStyle>
+    <a:lvl1pPr marL="0" algn="l" defTabSz="914400" rtl="0" eaLnBrk="1" latinLnBrk="1" hangingPunct="1">
+      <a:defRPr sz="1200" kern="1200">
+        <a:solidFill>
+          <a:schemeClr val="tx1"/>
+        </a:solidFill>
+        <a:latin typeface="+mn-lt"/>
+        <a:ea typeface="+mn-ea"/>
+        <a:cs typeface="+mn-cs"/>
+      </a:defRPr>
+    </a:lvl1pPr>
+    <a:lvl2pPr marL="457200" algn="l" defTabSz="914400" rtl="0" eaLnBrk="1" latinLnBrk="1" hangingPunct="1">
+      <a:defRPr sz="1200" kern="1200">
+        <a:solidFill>
+          <a:schemeClr val="tx1"/>
+        </a:solidFill>
+        <a:latin typeface="+mn-lt"/>
+        <a:ea typeface="+mn-ea"/>
+        <a:cs typeface="+mn-cs"/>
+      </a:defRPr>
+    </a:lvl2pPr>
+    <a:lvl3pPr marL="914400" algn="l" defTabSz="914400" rtl="0" eaLnBrk="1" latinLnBrk="1" hangingPunct="1">
+      <a:defRPr sz="1200" kern="1200">
+        <a:solidFill>
+          <a:schemeClr val="tx1"/>
+        </a:solidFill>
+        <a:latin typeface="+mn-lt"/>
+        <a:ea typeface="+mn-ea"/>
+        <a:cs typeface="+mn-cs"/>
+      </a:defRPr>
+    </a:lvl3pPr>
+    <a:lvl4pPr marL="1371600" algn="l" defTabSz="914400" rtl="0" eaLnBrk="1" latinLnBrk="1" hangingPunct="1">
+      <a:defRPr sz="1200" kern="1200">
+        <a:solidFill>
+          <a:schemeClr val="tx1"/>
+        </a:solidFill>
+        <a:latin typeface="+mn-lt"/>
+        <a:ea typeface="+mn-ea"/>
+        <a:cs typeface="+mn-cs"/>
+      </a:defRPr>
+    </a:lvl4pPr>
+    <a:lvl5pPr marL="1828800" algn="l" defTabSz="914400" rtl="0" eaLnBrk="1" latinLnBrk="1" hangingPunct="1">
+      <a:defRPr sz="1200" kern="1200">
+        <a:solidFill>
+          <a:schemeClr val="tx1"/>
+        </a:solidFill>
+        <a:latin typeface="+mn-lt"/>
+        <a:ea typeface="+mn-ea"/>
+        <a:cs typeface="+mn-cs"/>
+      </a:defRPr>
+    </a:lvl5pPr>
+    <a:lvl6pPr marL="2286000" algn="l" defTabSz="914400" rtl="0" eaLnBrk="1" latinLnBrk="1" hangingPunct="1">
+      <a:defRPr sz="1200" kern="1200">
+        <a:solidFill>
+          <a:schemeClr val="tx1"/>
+        </a:solidFill>
+        <a:latin typeface="+mn-lt"/>
+        <a:ea typeface="+mn-ea"/>
+        <a:cs typeface="+mn-cs"/>
+      </a:defRPr>
+    </a:lvl6pPr>
+    <a:lvl7pPr marL="2743200" algn="l" defTabSz="914400" rtl="0" eaLnBrk="1" latinLnBrk="1" hangingPunct="1">
+      <a:defRPr sz="1200" kern="1200">
+        <a:solidFill>
+          <a:schemeClr val="tx1"/>
+        </a:solidFill>
+        <a:latin typeface="+mn-lt"/>
+        <a:ea typeface="+mn-ea"/>
+        <a:cs typeface="+mn-cs"/>
+      </a:defRPr>
+    </a:lvl7pPr>
+    <a:lvl8pPr marL="3200400" algn="l" defTabSz="914400" rtl="0" eaLnBrk="1" latinLnBrk="1" hangingPunct="1">
+      <a:defRPr sz="1200" kern="1200">
+        <a:solidFill>
+          <a:schemeClr val="tx1"/>
+        </a:solidFill>
+        <a:latin typeface="+mn-lt"/>
+        <a:ea typeface="+mn-ea"/>
+        <a:cs typeface="+mn-cs"/>
+      </a:defRPr>
+    </a:lvl8pPr>
+    <a:lvl9pPr marL="3657600" algn="l" defTabSz="914400" rtl="0" eaLnBrk="1" latinLnBrk="1" hangingPunct="1">
+      <a:defRPr sz="1200" kern="1200">
+        <a:solidFill>
+          <a:schemeClr val="tx1"/>
+        </a:solidFill>
+        <a:latin typeface="+mn-lt"/>
+        <a:ea typeface="+mn-ea"/>
+        <a:cs typeface="+mn-cs"/>
+      </a:defRPr>
+    </a:lvl9pPr>
+  </p:notesStyle>
+</p:notesMaster>
+</file>
+
+<file path=ppt/notesSlides/notesSlide1.xml><?xml version="1.0" encoding="utf-8"?>
+<p:notes xmlns:a="http://schemas.openxmlformats.org/drawingml/2006/main" xmlns:r="http://schemas.openxmlformats.org/officeDocument/2006/relationships" xmlns:p="http://schemas.openxmlformats.org/presentationml/2006/main">
+  <p:cSld>
+    <p:spTree>
+      <p:nvGrpSpPr>
+        <p:cNvPr id="1" name=""/>
+        <p:cNvGrpSpPr/>
+        <p:nvPr/>
+      </p:nvGrpSpPr>
+      <p:grpSpPr>
+        <a:xfrm>
+          <a:off x="0" y="0"/>
+          <a:ext cx="0" cy="0"/>
+          <a:chOff x="0" y="0"/>
+          <a:chExt cx="0" cy="0"/>
+        </a:xfrm>
+      </p:grpSpPr>
+      <p:sp>
+        <p:nvSpPr>
+          <p:cNvPr id="2" name="슬라이드 이미지 개체 틀 1"/>
+          <p:cNvSpPr>
+            <a:spLocks noGrp="1" noRot="1" noChangeAspect="1"/>
+          </p:cNvSpPr>
+          <p:nvPr>
+            <p:ph type="sldImg"/>
+          </p:nvPr>
+        </p:nvSpPr>
+        <p:spPr/>
+      </p:sp>
+      <p:sp>
+        <p:nvSpPr>
+          <p:cNvPr id="3" name="슬라이드 노트 개체 틀 2"/>
+          <p:cNvSpPr>
+            <a:spLocks noGrp="1"/>
+          </p:cNvSpPr>
+          <p:nvPr>
+            <p:ph type="body" idx="1"/>
+          </p:nvPr>
+        </p:nvSpPr>
+        <p:spPr/>
+        <p:txBody>
+          <a:bodyPr/>
+          <a:lstStyle/>
+          <a:p>
+            <a:endParaRPr lang="ko-KR" altLang="en-US"/>
+          </a:p>
+        </p:txBody>
+      </p:sp>
+      <p:sp>
+        <p:nvSpPr>
+          <p:cNvPr id="4" name="슬라이드 번호 개체 틀 3"/>
+          <p:cNvSpPr>
+            <a:spLocks noGrp="1"/>
+          </p:cNvSpPr>
+          <p:nvPr>
+            <p:ph type="sldNum" sz="quarter" idx="10"/>
+          </p:nvPr>
+        </p:nvSpPr>
+        <p:spPr/>
+        <p:txBody>
+          <a:bodyPr/>
+          <a:lstStyle/>
+          <a:p>
+            <a:fld id="{72F17EC9-D261-4876-B456-23D0954C1B42}" type="slidenum">
+              <a:rPr lang="ko-KR" altLang="en-US" smtClean="0"/>
+              <a:t>1</a:t>
+            </a:fld>
+            <a:endParaRPr lang="ko-KR" altLang="en-US"/>
+          </a:p>
+        </p:txBody>
+      </p:sp>
+    </p:spTree>
+    <p:extLst>
+      <p:ext uri="{BB962C8B-B14F-4D97-AF65-F5344CB8AC3E}">
+        <p14:creationId xmlns:p14="http://schemas.microsoft.com/office/powerpoint/2010/main" val="1205110496"/>
+      </p:ext>
+    </p:extLst>
+  </p:cSld>
+  <p:clrMapOvr>
+    <a:masterClrMapping/>
+  </p:clrMapOvr>
+</p:notes>
+</file>
+
 <file path=ppt/slideLayouts/slideLayout1.xml><?xml version="1.0" encoding="utf-8"?>
 <p:sldLayout xmlns:a="http://schemas.openxmlformats.org/drawingml/2006/main" xmlns:r="http://schemas.openxmlformats.org/officeDocument/2006/relationships" xmlns:p="http://schemas.openxmlformats.org/presentationml/2006/main" type="title" preserve="1">
   <p:cSld name="제목 슬라이드">
@@ -243,7 +680,7 @@
           <a:p>
             <a:fld id="{B1FD5498-DCDD-4148-88F2-895E53B04C3D}" type="datetimeFigureOut">
               <a:rPr lang="ko-KR" altLang="en-US" smtClean="0"/>
-              <a:t>2020-05-10</a:t>
+              <a:t>2020-06-08</a:t>
             </a:fld>
             <a:endParaRPr lang="ko-KR" altLang="en-US"/>
           </a:p>
@@ -413,7 +850,7 @@
           <a:p>
             <a:fld id="{B1FD5498-DCDD-4148-88F2-895E53B04C3D}" type="datetimeFigureOut">
               <a:rPr lang="ko-KR" altLang="en-US" smtClean="0"/>
-              <a:t>2020-05-10</a:t>
+              <a:t>2020-06-08</a:t>
             </a:fld>
             <a:endParaRPr lang="ko-KR" altLang="en-US"/>
           </a:p>
@@ -593,7 +1030,7 @@
           <a:p>
             <a:fld id="{B1FD5498-DCDD-4148-88F2-895E53B04C3D}" type="datetimeFigureOut">
               <a:rPr lang="ko-KR" altLang="en-US" smtClean="0"/>
-              <a:t>2020-05-10</a:t>
+              <a:t>2020-06-08</a:t>
             </a:fld>
             <a:endParaRPr lang="ko-KR" altLang="en-US"/>
           </a:p>
@@ -763,7 +1200,7 @@
           <a:p>
             <a:fld id="{B1FD5498-DCDD-4148-88F2-895E53B04C3D}" type="datetimeFigureOut">
               <a:rPr lang="ko-KR" altLang="en-US" smtClean="0"/>
-              <a:t>2020-05-10</a:t>
+              <a:t>2020-06-08</a:t>
             </a:fld>
             <a:endParaRPr lang="ko-KR" altLang="en-US"/>
           </a:p>
@@ -1009,7 +1446,7 @@
           <a:p>
             <a:fld id="{B1FD5498-DCDD-4148-88F2-895E53B04C3D}" type="datetimeFigureOut">
               <a:rPr lang="ko-KR" altLang="en-US" smtClean="0"/>
-              <a:t>2020-05-10</a:t>
+              <a:t>2020-06-08</a:t>
             </a:fld>
             <a:endParaRPr lang="ko-KR" altLang="en-US"/>
           </a:p>
@@ -1241,7 +1678,7 @@
           <a:p>
             <a:fld id="{B1FD5498-DCDD-4148-88F2-895E53B04C3D}" type="datetimeFigureOut">
               <a:rPr lang="ko-KR" altLang="en-US" smtClean="0"/>
-              <a:t>2020-05-10</a:t>
+              <a:t>2020-06-08</a:t>
             </a:fld>
             <a:endParaRPr lang="ko-KR" altLang="en-US"/>
           </a:p>
@@ -1608,7 +2045,7 @@
           <a:p>
             <a:fld id="{B1FD5498-DCDD-4148-88F2-895E53B04C3D}" type="datetimeFigureOut">
               <a:rPr lang="ko-KR" altLang="en-US" smtClean="0"/>
-              <a:t>2020-05-10</a:t>
+              <a:t>2020-06-08</a:t>
             </a:fld>
             <a:endParaRPr lang="ko-KR" altLang="en-US"/>
           </a:p>
@@ -1726,7 +2163,7 @@
           <a:p>
             <a:fld id="{B1FD5498-DCDD-4148-88F2-895E53B04C3D}" type="datetimeFigureOut">
               <a:rPr lang="ko-KR" altLang="en-US" smtClean="0"/>
-              <a:t>2020-05-10</a:t>
+              <a:t>2020-06-08</a:t>
             </a:fld>
             <a:endParaRPr lang="ko-KR" altLang="en-US"/>
           </a:p>
@@ -1821,7 +2258,7 @@
           <a:p>
             <a:fld id="{B1FD5498-DCDD-4148-88F2-895E53B04C3D}" type="datetimeFigureOut">
               <a:rPr lang="ko-KR" altLang="en-US" smtClean="0"/>
-              <a:t>2020-05-10</a:t>
+              <a:t>2020-06-08</a:t>
             </a:fld>
             <a:endParaRPr lang="ko-KR" altLang="en-US"/>
           </a:p>
@@ -2098,7 +2535,7 @@
           <a:p>
             <a:fld id="{B1FD5498-DCDD-4148-88F2-895E53B04C3D}" type="datetimeFigureOut">
               <a:rPr lang="ko-KR" altLang="en-US" smtClean="0"/>
-              <a:t>2020-05-10</a:t>
+              <a:t>2020-06-08</a:t>
             </a:fld>
             <a:endParaRPr lang="ko-KR" altLang="en-US"/>
           </a:p>
@@ -2351,7 +2788,7 @@
           <a:p>
             <a:fld id="{B1FD5498-DCDD-4148-88F2-895E53B04C3D}" type="datetimeFigureOut">
               <a:rPr lang="ko-KR" altLang="en-US" smtClean="0"/>
-              <a:t>2020-05-10</a:t>
+              <a:t>2020-06-08</a:t>
             </a:fld>
             <a:endParaRPr lang="ko-KR" altLang="en-US"/>
           </a:p>
@@ -2564,7 +3001,7 @@
           <a:p>
             <a:fld id="{B1FD5498-DCDD-4148-88F2-895E53B04C3D}" type="datetimeFigureOut">
               <a:rPr lang="ko-KR" altLang="en-US" smtClean="0"/>
-              <a:t>2020-05-10</a:t>
+              <a:t>2020-06-08</a:t>
             </a:fld>
             <a:endParaRPr lang="ko-KR" altLang="en-US"/>
           </a:p>
@@ -2955,14 +3392,6 @@
 <file path=ppt/slides/slide1.xml><?xml version="1.0" encoding="utf-8"?>
 <p:sld xmlns:a="http://schemas.openxmlformats.org/drawingml/2006/main" xmlns:r="http://schemas.openxmlformats.org/officeDocument/2006/relationships" xmlns:p="http://schemas.openxmlformats.org/presentationml/2006/main">
   <p:cSld>
-    <p:bg>
-      <p:bgPr>
-        <a:solidFill>
-          <a:srgbClr val="FFDDDD"/>
-        </a:solidFill>
-        <a:effectLst/>
-      </p:bgPr>
-    </p:bg>
     <p:spTree>
       <p:nvGrpSpPr>
         <p:cNvPr id="1" name=""/>
@@ -2986,15 +3415,15 @@
           <p:nvPr/>
         </p:nvPicPr>
         <p:blipFill>
-          <a:blip r:embed="rId2"/>
+          <a:blip r:embed="rId3"/>
           <a:stretch>
             <a:fillRect/>
           </a:stretch>
         </p:blipFill>
         <p:spPr>
           <a:xfrm>
-            <a:off x="2535367" y="4976801"/>
-            <a:ext cx="1784491" cy="647008"/>
+            <a:off x="577412" y="5174295"/>
+            <a:ext cx="1660819" cy="647008"/>
           </a:xfrm>
           <a:prstGeom prst="rect">
             <a:avLst/>
@@ -3010,7 +3439,7 @@
           <p:nvPr/>
         </p:nvPicPr>
         <p:blipFill>
-          <a:blip r:embed="rId3" cstate="print">
+          <a:blip r:embed="rId4" cstate="print">
             <a:extLst>
               <a:ext uri="{28A0092B-C50C-407E-A947-70E740481C1C}">
                 <a14:useLocalDpi xmlns:a14="http://schemas.microsoft.com/office/drawing/2010/main" val="0"/>
@@ -3039,8 +3468,8 @@
         </p:nvSpPr>
         <p:spPr>
           <a:xfrm>
-            <a:off x="9917723" y="1032247"/>
-            <a:ext cx="1951892" cy="1200156"/>
+            <a:off x="9130354" y="428912"/>
+            <a:ext cx="2101755" cy="848018"/>
           </a:xfrm>
           <a:prstGeom prst="roundRect">
             <a:avLst/>
@@ -3076,18 +3505,20 @@
         <p:nvCxnSpPr>
           <p:cNvPr id="25" name="꺾인 연결선 24"/>
           <p:cNvCxnSpPr>
-            <a:stCxn id="43" idx="3"/>
+            <a:stCxn id="43" idx="0"/>
             <a:endCxn id="14" idx="2"/>
           </p:cNvCxnSpPr>
           <p:nvPr/>
         </p:nvCxnSpPr>
         <p:spPr>
-          <a:xfrm flipV="1">
-            <a:off x="9520237" y="2232403"/>
-            <a:ext cx="1373432" cy="1226815"/>
-          </a:xfrm>
-          <a:prstGeom prst="bentConnector2">
-            <a:avLst/>
+          <a:xfrm rot="5400000" flipH="1" flipV="1">
+            <a:off x="10015538" y="1442622"/>
+            <a:ext cx="331386" cy="2"/>
+          </a:xfrm>
+          <a:prstGeom prst="bentConnector3">
+            <a:avLst>
+              <a:gd name="adj1" fmla="val 50000"/>
+            </a:avLst>
           </a:prstGeom>
           <a:ln w="19050">
             <a:solidFill>
@@ -3123,8 +3554,8 @@
         </p:nvCxnSpPr>
         <p:spPr>
           <a:xfrm flipV="1">
-            <a:off x="3539723" y="1430179"/>
-            <a:ext cx="988315" cy="3087"/>
+            <a:off x="3285216" y="1391434"/>
+            <a:ext cx="999132" cy="3707"/>
           </a:xfrm>
           <a:prstGeom prst="straightConnector1">
             <a:avLst/>
@@ -3154,154 +3585,17 @@
       </p:cxnSp>
       <p:cxnSp>
         <p:nvCxnSpPr>
-          <p:cNvPr id="33" name="꺾인 연결선 32"/>
+          <p:cNvPr id="37" name="직선 화살표 연결선 36"/>
           <p:cNvCxnSpPr>
-            <a:stCxn id="10" idx="3"/>
-            <a:endCxn id="43" idx="0"/>
+            <a:stCxn id="4" idx="3"/>
+            <a:endCxn id="86" idx="1"/>
           </p:cNvCxnSpPr>
           <p:nvPr/>
         </p:nvCxnSpPr>
         <p:spPr>
-          <a:xfrm>
-            <a:off x="8029575" y="1430179"/>
-            <a:ext cx="523875" cy="1227839"/>
-          </a:xfrm>
-          <a:prstGeom prst="bentConnector2">
-            <a:avLst/>
-          </a:prstGeom>
-          <a:ln w="19050">
-            <a:solidFill>
-              <a:schemeClr val="tx1"/>
-            </a:solidFill>
-            <a:headEnd type="triangle"/>
-            <a:tailEnd type="triangle"/>
-          </a:ln>
-        </p:spPr>
-        <p:style>
-          <a:lnRef idx="1">
-            <a:schemeClr val="accent1"/>
-          </a:lnRef>
-          <a:fillRef idx="0">
-            <a:schemeClr val="accent1"/>
-          </a:fillRef>
-          <a:effectRef idx="0">
-            <a:schemeClr val="accent1"/>
-          </a:effectRef>
-          <a:fontRef idx="minor">
-            <a:schemeClr val="tx1"/>
-          </a:fontRef>
-        </p:style>
-      </p:cxnSp>
-      <p:grpSp>
-        <p:nvGrpSpPr>
-          <p:cNvPr id="35" name="그룹 34"/>
-          <p:cNvGrpSpPr/>
-          <p:nvPr/>
-        </p:nvGrpSpPr>
-        <p:grpSpPr>
-          <a:xfrm>
-            <a:off x="5424266" y="4495249"/>
-            <a:ext cx="1597026" cy="1610112"/>
-            <a:chOff x="4528039" y="4704963"/>
-            <a:chExt cx="1597026" cy="1610112"/>
-          </a:xfrm>
-        </p:grpSpPr>
-        <p:sp>
-          <p:nvSpPr>
-            <p:cNvPr id="12" name="직사각형 11"/>
-            <p:cNvSpPr/>
-            <p:nvPr/>
-          </p:nvSpPr>
-          <p:spPr>
-            <a:xfrm>
-              <a:off x="4528039" y="4704963"/>
-              <a:ext cx="1597026" cy="1610112"/>
-            </a:xfrm>
-            <a:prstGeom prst="rect">
-              <a:avLst/>
-            </a:prstGeom>
-            <a:noFill/>
-          </p:spPr>
-          <p:style>
-            <a:lnRef idx="2">
-              <a:schemeClr val="accent1">
-                <a:shade val="50000"/>
-              </a:schemeClr>
-            </a:lnRef>
-            <a:fillRef idx="1">
-              <a:schemeClr val="accent1"/>
-            </a:fillRef>
-            <a:effectRef idx="0">
-              <a:schemeClr val="accent1"/>
-            </a:effectRef>
-            <a:fontRef idx="minor">
-              <a:schemeClr val="lt1"/>
-            </a:fontRef>
-          </p:style>
-          <p:txBody>
-            <a:bodyPr rtlCol="0" anchor="ctr"/>
-            <a:lstStyle/>
-            <a:p>
-              <a:pPr algn="ctr"/>
-              <a:endParaRPr lang="ko-KR" altLang="en-US"/>
-            </a:p>
-          </p:txBody>
-        </p:sp>
-        <p:pic>
-          <p:nvPicPr>
-            <p:cNvPr id="1038" name="Picture 14" descr="Vue.js - 위키백과, 우리 모두의 백과사전"/>
-            <p:cNvPicPr>
-              <a:picLocks noChangeAspect="1" noChangeArrowheads="1"/>
-            </p:cNvPicPr>
-            <p:nvPr/>
-          </p:nvPicPr>
-          <p:blipFill>
-            <a:blip r:embed="rId4">
-              <a:extLst>
-                <a:ext uri="{28A0092B-C50C-407E-A947-70E740481C1C}">
-                  <a14:useLocalDpi xmlns:a14="http://schemas.microsoft.com/office/drawing/2010/main" val="0"/>
-                </a:ext>
-              </a:extLst>
-            </a:blip>
-            <a:srcRect/>
-            <a:stretch>
-              <a:fillRect/>
-            </a:stretch>
-          </p:blipFill>
-          <p:spPr bwMode="auto">
-            <a:xfrm>
-              <a:off x="4692531" y="4899858"/>
-              <a:ext cx="1262816" cy="1262817"/>
-            </a:xfrm>
-            <a:prstGeom prst="rect">
-              <a:avLst/>
-            </a:prstGeom>
-            <a:noFill/>
-            <a:extLst>
-              <a:ext uri="{909E8E84-426E-40DD-AFC4-6F175D3DCCD1}">
-                <a14:hiddenFill xmlns:a14="http://schemas.microsoft.com/office/drawing/2010/main">
-                  <a:solidFill>
-                    <a:srgbClr val="FFFFFF"/>
-                  </a:solidFill>
-                </a14:hiddenFill>
-              </a:ext>
-            </a:extLst>
-          </p:spPr>
-        </p:pic>
-      </p:grpSp>
-      <p:cxnSp>
-        <p:nvCxnSpPr>
-          <p:cNvPr id="37" name="직선 화살표 연결선 36"/>
-          <p:cNvCxnSpPr>
-            <a:stCxn id="4" idx="3"/>
-            <a:endCxn id="12" idx="1"/>
-          </p:cNvCxnSpPr>
-          <p:nvPr/>
-        </p:nvCxnSpPr>
-        <p:spPr>
-          <a:xfrm>
-            <a:off x="4319858" y="5300305"/>
-            <a:ext cx="1104408" cy="0"/>
+          <a:xfrm flipV="1">
+            <a:off x="2238231" y="4881776"/>
+            <a:ext cx="2221361" cy="616023"/>
           </a:xfrm>
           <a:prstGeom prst="straightConnector1">
             <a:avLst/>
@@ -3329,148 +3623,52 @@
           </a:fontRef>
         </p:style>
       </p:cxnSp>
-      <p:cxnSp>
-        <p:nvCxnSpPr>
-          <p:cNvPr id="39" name="꺾인 연결선 38"/>
-          <p:cNvCxnSpPr>
-            <a:stCxn id="12" idx="3"/>
-            <a:endCxn id="43" idx="2"/>
-          </p:cNvCxnSpPr>
+      <p:sp>
+        <p:nvSpPr>
+          <p:cNvPr id="43" name="직사각형 42"/>
+          <p:cNvSpPr/>
           <p:nvPr/>
-        </p:nvCxnSpPr>
+        </p:nvSpPr>
         <p:spPr>
-          <a:xfrm flipV="1">
-            <a:off x="7021292" y="4260417"/>
-            <a:ext cx="1532158" cy="1039888"/>
-          </a:xfrm>
-          <a:prstGeom prst="bentConnector2">
+          <a:xfrm>
+            <a:off x="8625385" y="1608316"/>
+            <a:ext cx="3111689" cy="2550801"/>
+          </a:xfrm>
+          <a:prstGeom prst="rect">
             <a:avLst/>
           </a:prstGeom>
-          <a:ln w="19050">
+          <a:noFill/>
+          <a:ln>
             <a:solidFill>
               <a:schemeClr val="tx1"/>
             </a:solidFill>
-            <a:headEnd type="triangle"/>
-            <a:tailEnd type="triangle"/>
           </a:ln>
         </p:spPr>
         <p:style>
-          <a:lnRef idx="1">
-            <a:schemeClr val="accent1"/>
+          <a:lnRef idx="2">
+            <a:schemeClr val="accent1">
+              <a:shade val="50000"/>
+            </a:schemeClr>
           </a:lnRef>
-          <a:fillRef idx="0">
+          <a:fillRef idx="1">
             <a:schemeClr val="accent1"/>
           </a:fillRef>
           <a:effectRef idx="0">
             <a:schemeClr val="accent1"/>
           </a:effectRef>
           <a:fontRef idx="minor">
-            <a:schemeClr val="tx1"/>
+            <a:schemeClr val="lt1"/>
           </a:fontRef>
         </p:style>
-      </p:cxnSp>
-      <p:grpSp>
-        <p:nvGrpSpPr>
-          <p:cNvPr id="44" name="그룹 43"/>
-          <p:cNvGrpSpPr/>
-          <p:nvPr/>
-        </p:nvGrpSpPr>
-        <p:grpSpPr>
-          <a:xfrm>
-            <a:off x="7586662" y="2658018"/>
-            <a:ext cx="1933575" cy="1602399"/>
-            <a:chOff x="7620000" y="2474301"/>
-            <a:chExt cx="1933575" cy="1602399"/>
-          </a:xfrm>
-        </p:grpSpPr>
-        <p:sp>
-          <p:nvSpPr>
-            <p:cNvPr id="43" name="직사각형 42"/>
-            <p:cNvSpPr/>
-            <p:nvPr/>
-          </p:nvSpPr>
-          <p:spPr>
-            <a:xfrm>
-              <a:off x="7620000" y="2474301"/>
-              <a:ext cx="1933575" cy="1602399"/>
-            </a:xfrm>
-            <a:prstGeom prst="rect">
-              <a:avLst/>
-            </a:prstGeom>
-            <a:noFill/>
-            <a:ln>
-              <a:solidFill>
-                <a:schemeClr val="tx1"/>
-              </a:solidFill>
-            </a:ln>
-          </p:spPr>
-          <p:style>
-            <a:lnRef idx="2">
-              <a:schemeClr val="accent1">
-                <a:shade val="50000"/>
-              </a:schemeClr>
-            </a:lnRef>
-            <a:fillRef idx="1">
-              <a:schemeClr val="accent1"/>
-            </a:fillRef>
-            <a:effectRef idx="0">
-              <a:schemeClr val="accent1"/>
-            </a:effectRef>
-            <a:fontRef idx="minor">
-              <a:schemeClr val="lt1"/>
-            </a:fontRef>
-          </p:style>
-          <p:txBody>
-            <a:bodyPr rtlCol="0" anchor="ctr"/>
-            <a:lstStyle/>
-            <a:p>
-              <a:pPr algn="ctr"/>
-              <a:endParaRPr lang="ko-KR" altLang="en-US"/>
-            </a:p>
-          </p:txBody>
-        </p:sp>
-        <p:pic>
-          <p:nvPicPr>
-            <p:cNvPr id="1040" name="Picture 16" descr="Do web development using python django by Kaushal54"/>
-            <p:cNvPicPr>
-              <a:picLocks noChangeAspect="1" noChangeArrowheads="1"/>
-            </p:cNvPicPr>
-            <p:nvPr/>
-          </p:nvPicPr>
-          <p:blipFill>
-            <a:blip r:embed="rId5" cstate="print">
-              <a:extLst>
-                <a:ext uri="{28A0092B-C50C-407E-A947-70E740481C1C}">
-                  <a14:useLocalDpi xmlns:a14="http://schemas.microsoft.com/office/drawing/2010/main" val="0"/>
-                </a:ext>
-              </a:extLst>
-            </a:blip>
-            <a:srcRect/>
-            <a:stretch>
-              <a:fillRect/>
-            </a:stretch>
-          </p:blipFill>
-          <p:spPr bwMode="auto">
-            <a:xfrm>
-              <a:off x="7742550" y="2575665"/>
-              <a:ext cx="1684558" cy="1399670"/>
-            </a:xfrm>
-            <a:prstGeom prst="rect">
-              <a:avLst/>
-            </a:prstGeom>
-            <a:noFill/>
-            <a:extLst>
-              <a:ext uri="{909E8E84-426E-40DD-AFC4-6F175D3DCCD1}">
-                <a14:hiddenFill xmlns:a14="http://schemas.microsoft.com/office/drawing/2010/main">
-                  <a:solidFill>
-                    <a:srgbClr val="FFFFFF"/>
-                  </a:solidFill>
-                </a14:hiddenFill>
-              </a:ext>
-            </a:extLst>
-          </p:spPr>
-        </p:pic>
-      </p:grpSp>
+        <p:txBody>
+          <a:bodyPr rtlCol="0" anchor="ctr"/>
+          <a:lstStyle/>
+          <a:p>
+            <a:pPr algn="ctr"/>
+            <a:endParaRPr lang="ko-KR" altLang="en-US"/>
+          </a:p>
+        </p:txBody>
+      </p:sp>
       <p:cxnSp>
         <p:nvCxnSpPr>
           <p:cNvPr id="49" name="꺾인 연결선 48"/>
@@ -3482,8 +3680,8 @@
         </p:nvCxnSpPr>
         <p:spPr>
           <a:xfrm rot="5400000" flipH="1" flipV="1">
-            <a:off x="1390691" y="1451235"/>
-            <a:ext cx="1078403" cy="1042467"/>
+            <a:off x="1244375" y="1559425"/>
+            <a:ext cx="1116528" cy="787960"/>
           </a:xfrm>
           <a:prstGeom prst="bentConnector2">
             <a:avLst/>
@@ -3516,17 +3714,19 @@
           <p:cNvPr id="51" name="꺾인 연결선 50"/>
           <p:cNvCxnSpPr>
             <a:stCxn id="5" idx="2"/>
-            <a:endCxn id="4" idx="1"/>
+            <a:endCxn id="4" idx="0"/>
           </p:cNvCxnSpPr>
           <p:nvPr/>
         </p:nvCxnSpPr>
         <p:spPr>
-          <a:xfrm rot="16200000" flipH="1">
-            <a:off x="1401419" y="4166357"/>
-            <a:ext cx="1141188" cy="1126708"/>
-          </a:xfrm>
-          <a:prstGeom prst="bentConnector2">
-            <a:avLst/>
+          <a:xfrm rot="5400000">
+            <a:off x="900652" y="4666288"/>
+            <a:ext cx="1015178" cy="837"/>
+          </a:xfrm>
+          <a:prstGeom prst="bentConnector3">
+            <a:avLst>
+              <a:gd name="adj1" fmla="val 50000"/>
+            </a:avLst>
           </a:prstGeom>
           <a:ln w="19050">
             <a:solidFill>
@@ -3559,7 +3759,7 @@
         </p:nvSpPr>
         <p:spPr>
           <a:xfrm>
-            <a:off x="9702034" y="5736029"/>
+            <a:off x="9563130" y="6295733"/>
             <a:ext cx="2167581" cy="369332"/>
           </a:xfrm>
           <a:prstGeom prst="rect">
@@ -3602,14 +3802,14 @@
           <p:nvPr/>
         </p:nvPicPr>
         <p:blipFill>
-          <a:blip r:embed="rId6"/>
+          <a:blip r:embed="rId5"/>
           <a:stretch>
             <a:fillRect/>
           </a:stretch>
         </p:blipFill>
         <p:spPr>
           <a:xfrm>
-            <a:off x="2451126" y="852921"/>
+            <a:off x="2196619" y="814796"/>
             <a:ext cx="1088597" cy="1160689"/>
           </a:xfrm>
           <a:prstGeom prst="rect">
@@ -3626,7 +3826,7 @@
           <p:nvPr/>
         </p:nvPicPr>
         <p:blipFill>
-          <a:blip r:embed="rId7" cstate="print">
+          <a:blip r:embed="rId6" cstate="print">
             <a:extLst>
               <a:ext uri="{28A0092B-C50C-407E-A947-70E740481C1C}">
                 <a14:useLocalDpi xmlns:a14="http://schemas.microsoft.com/office/drawing/2010/main" val="0"/>
@@ -3640,8 +3840,8 @@
         </p:blipFill>
         <p:spPr bwMode="auto">
           <a:xfrm>
-            <a:off x="10048730" y="1195333"/>
-            <a:ext cx="1689877" cy="873983"/>
+            <a:off x="9463110" y="550583"/>
+            <a:ext cx="1478152" cy="594678"/>
           </a:xfrm>
           <a:prstGeom prst="rect">
             <a:avLst/>
@@ -3666,7 +3866,7 @@
         </p:nvGrpSpPr>
         <p:grpSpPr>
           <a:xfrm>
-            <a:off x="4528038" y="210191"/>
+            <a:off x="4284348" y="171446"/>
             <a:ext cx="3501537" cy="2129079"/>
             <a:chOff x="4528038" y="210191"/>
             <a:chExt cx="3501537" cy="2129079"/>
@@ -3736,7 +3936,7 @@
               <p:nvPr/>
             </p:nvPicPr>
             <p:blipFill>
-              <a:blip r:embed="rId8" cstate="print">
+              <a:blip r:embed="rId7" cstate="print">
                 <a:extLst>
                   <a:ext uri="{28A0092B-C50C-407E-A947-70E740481C1C}">
                     <a14:useLocalDpi xmlns:a14="http://schemas.microsoft.com/office/drawing/2010/main" val="0"/>
@@ -3777,7 +3977,7 @@
               <p:nvPr/>
             </p:nvPicPr>
             <p:blipFill>
-              <a:blip r:embed="rId9" cstate="print">
+              <a:blip r:embed="rId8" cstate="print">
                 <a:extLst>
                   <a:ext uri="{28A0092B-C50C-407E-A947-70E740481C1C}">
                     <a14:useLocalDpi xmlns:a14="http://schemas.microsoft.com/office/drawing/2010/main" val="0"/>
@@ -3872,7 +4072,7 @@
             <p:nvPr/>
           </p:nvPicPr>
           <p:blipFill>
-            <a:blip r:embed="rId10">
+            <a:blip r:embed="rId9">
               <a:extLst>
                 <a:ext uri="{28A0092B-C50C-407E-A947-70E740481C1C}">
                   <a14:useLocalDpi xmlns:a14="http://schemas.microsoft.com/office/drawing/2010/main" val="0"/>
@@ -3905,6 +4105,707 @@
           </p:spPr>
         </p:pic>
       </p:grpSp>
+      <p:pic>
+        <p:nvPicPr>
+          <p:cNvPr id="15" name="Picture 2" descr="django REST framework로 간단한 api 만들기"/>
+          <p:cNvPicPr>
+            <a:picLocks noChangeAspect="1" noChangeArrowheads="1"/>
+          </p:cNvPicPr>
+          <p:nvPr/>
+        </p:nvPicPr>
+        <p:blipFill>
+          <a:blip r:embed="rId10" cstate="print">
+            <a:extLst>
+              <a:ext uri="{28A0092B-C50C-407E-A947-70E740481C1C}">
+                <a14:useLocalDpi xmlns:a14="http://schemas.microsoft.com/office/drawing/2010/main" val="0"/>
+              </a:ext>
+            </a:extLst>
+          </a:blip>
+          <a:srcRect/>
+          <a:stretch>
+            <a:fillRect/>
+          </a:stretch>
+        </p:blipFill>
+        <p:spPr bwMode="auto">
+          <a:xfrm>
+            <a:off x="8614079" y="2041657"/>
+            <a:ext cx="2040880" cy="901389"/>
+          </a:xfrm>
+          <a:prstGeom prst="rect">
+            <a:avLst/>
+          </a:prstGeom>
+          <a:noFill/>
+          <a:extLst>
+            <a:ext uri="{909E8E84-426E-40DD-AFC4-6F175D3DCCD1}">
+              <a14:hiddenFill xmlns:a14="http://schemas.microsoft.com/office/drawing/2010/main">
+                <a:solidFill>
+                  <a:srgbClr val="FFFFFF"/>
+                </a:solidFill>
+              </a14:hiddenFill>
+            </a:ext>
+          </a:extLst>
+        </p:spPr>
+      </p:pic>
+      <p:pic>
+        <p:nvPicPr>
+          <p:cNvPr id="1048" name="Picture 24" descr="python개발자 uwsgi를 버리고 gunicorn(지-유니콘)으로 갈아타다 ..."/>
+          <p:cNvPicPr>
+            <a:picLocks noChangeAspect="1" noChangeArrowheads="1"/>
+          </p:cNvPicPr>
+          <p:nvPr/>
+        </p:nvPicPr>
+        <p:blipFill>
+          <a:blip r:embed="rId11" cstate="print">
+            <a:extLst>
+              <a:ext uri="{28A0092B-C50C-407E-A947-70E740481C1C}">
+                <a14:useLocalDpi xmlns:a14="http://schemas.microsoft.com/office/drawing/2010/main" val="0"/>
+              </a:ext>
+            </a:extLst>
+          </a:blip>
+          <a:srcRect/>
+          <a:stretch>
+            <a:fillRect/>
+          </a:stretch>
+        </p:blipFill>
+        <p:spPr bwMode="auto">
+          <a:xfrm>
+            <a:off x="9125001" y="3224332"/>
+            <a:ext cx="2041052" cy="578380"/>
+          </a:xfrm>
+          <a:prstGeom prst="rect">
+            <a:avLst/>
+          </a:prstGeom>
+          <a:noFill/>
+          <a:extLst>
+            <a:ext uri="{909E8E84-426E-40DD-AFC4-6F175D3DCCD1}">
+              <a14:hiddenFill xmlns:a14="http://schemas.microsoft.com/office/drawing/2010/main">
+                <a:solidFill>
+                  <a:srgbClr val="FFFFFF"/>
+                </a:solidFill>
+              </a14:hiddenFill>
+            </a:ext>
+          </a:extLst>
+        </p:spPr>
+      </p:pic>
+      <p:pic>
+        <p:nvPicPr>
+          <p:cNvPr id="1050" name="Picture 26" descr="python 라이브러리로 아주 간단한 웹서버 만들기"/>
+          <p:cNvPicPr>
+            <a:picLocks noChangeAspect="1" noChangeArrowheads="1"/>
+          </p:cNvPicPr>
+          <p:nvPr/>
+        </p:nvPicPr>
+        <p:blipFill rotWithShape="1">
+          <a:blip r:embed="rId12">
+            <a:extLst>
+              <a:ext uri="{28A0092B-C50C-407E-A947-70E740481C1C}">
+                <a14:useLocalDpi xmlns:a14="http://schemas.microsoft.com/office/drawing/2010/main" val="0"/>
+              </a:ext>
+            </a:extLst>
+          </a:blip>
+          <a:srcRect l="30491" t="9038" r="31272" b="7087"/>
+          <a:stretch/>
+        </p:blipFill>
+        <p:spPr bwMode="auto">
+          <a:xfrm>
+            <a:off x="10472082" y="1778825"/>
+            <a:ext cx="1193587" cy="1427052"/>
+          </a:xfrm>
+          <a:prstGeom prst="rect">
+            <a:avLst/>
+          </a:prstGeom>
+          <a:noFill/>
+          <a:extLst>
+            <a:ext uri="{909E8E84-426E-40DD-AFC4-6F175D3DCCD1}">
+              <a14:hiddenFill xmlns:a14="http://schemas.microsoft.com/office/drawing/2010/main">
+                <a:solidFill>
+                  <a:srgbClr val="FFFFFF"/>
+                </a:solidFill>
+              </a14:hiddenFill>
+            </a:ext>
+          </a:extLst>
+        </p:spPr>
+      </p:pic>
+      <p:cxnSp>
+        <p:nvCxnSpPr>
+          <p:cNvPr id="95" name="직선 화살표 연결선 94"/>
+          <p:cNvCxnSpPr/>
+          <p:nvPr/>
+        </p:nvCxnSpPr>
+        <p:spPr>
+          <a:xfrm flipV="1">
+            <a:off x="7661571" y="3021497"/>
+            <a:ext cx="963814" cy="1635313"/>
+          </a:xfrm>
+          <a:prstGeom prst="straightConnector1">
+            <a:avLst/>
+          </a:prstGeom>
+          <a:ln w="19050">
+            <a:solidFill>
+              <a:schemeClr val="tx1"/>
+            </a:solidFill>
+            <a:headEnd type="triangle"/>
+            <a:tailEnd type="triangle"/>
+          </a:ln>
+        </p:spPr>
+        <p:style>
+          <a:lnRef idx="1">
+            <a:schemeClr val="accent1"/>
+          </a:lnRef>
+          <a:fillRef idx="0">
+            <a:schemeClr val="accent1"/>
+          </a:fillRef>
+          <a:effectRef idx="0">
+            <a:schemeClr val="accent1"/>
+          </a:effectRef>
+          <a:fontRef idx="minor">
+            <a:schemeClr val="tx1"/>
+          </a:fontRef>
+        </p:style>
+      </p:cxnSp>
+      <p:cxnSp>
+        <p:nvCxnSpPr>
+          <p:cNvPr id="99" name="직선 화살표 연결선 98"/>
+          <p:cNvCxnSpPr>
+            <a:endCxn id="12" idx="1"/>
+          </p:cNvCxnSpPr>
+          <p:nvPr/>
+        </p:nvCxnSpPr>
+        <p:spPr>
+          <a:xfrm>
+            <a:off x="7678258" y="4994815"/>
+            <a:ext cx="935822" cy="402699"/>
+          </a:xfrm>
+          <a:prstGeom prst="straightConnector1">
+            <a:avLst/>
+          </a:prstGeom>
+          <a:ln w="19050">
+            <a:solidFill>
+              <a:schemeClr val="tx1"/>
+            </a:solidFill>
+            <a:headEnd type="triangle"/>
+            <a:tailEnd type="triangle"/>
+          </a:ln>
+        </p:spPr>
+        <p:style>
+          <a:lnRef idx="1">
+            <a:schemeClr val="accent1"/>
+          </a:lnRef>
+          <a:fillRef idx="0">
+            <a:schemeClr val="accent1"/>
+          </a:fillRef>
+          <a:effectRef idx="0">
+            <a:schemeClr val="accent1"/>
+          </a:effectRef>
+          <a:fontRef idx="minor">
+            <a:schemeClr val="tx1"/>
+          </a:fontRef>
+        </p:style>
+      </p:cxnSp>
+      <p:grpSp>
+        <p:nvGrpSpPr>
+          <p:cNvPr id="1059" name="그룹 1058"/>
+          <p:cNvGrpSpPr/>
+          <p:nvPr/>
+        </p:nvGrpSpPr>
+        <p:grpSpPr>
+          <a:xfrm>
+            <a:off x="4459592" y="3718293"/>
+            <a:ext cx="3122994" cy="1968539"/>
+            <a:chOff x="4489413" y="3052375"/>
+            <a:chExt cx="3122994" cy="1968539"/>
+          </a:xfrm>
+        </p:grpSpPr>
+        <p:pic>
+          <p:nvPicPr>
+            <p:cNvPr id="1032" name="Picture 8" descr="Nginx 표준식 변수 정리 | ThinkGround"/>
+            <p:cNvPicPr>
+              <a:picLocks noChangeAspect="1" noChangeArrowheads="1"/>
+            </p:cNvPicPr>
+            <p:nvPr/>
+          </p:nvPicPr>
+          <p:blipFill>
+            <a:blip r:embed="rId13">
+              <a:extLst>
+                <a:ext uri="{28A0092B-C50C-407E-A947-70E740481C1C}">
+                  <a14:useLocalDpi xmlns:a14="http://schemas.microsoft.com/office/drawing/2010/main" val="0"/>
+                </a:ext>
+              </a:extLst>
+            </a:blip>
+            <a:srcRect/>
+            <a:stretch>
+              <a:fillRect/>
+            </a:stretch>
+          </p:blipFill>
+          <p:spPr bwMode="auto">
+            <a:xfrm>
+              <a:off x="6349735" y="3717174"/>
+              <a:ext cx="1041349" cy="987317"/>
+            </a:xfrm>
+            <a:prstGeom prst="rect">
+              <a:avLst/>
+            </a:prstGeom>
+            <a:noFill/>
+            <a:extLst>
+              <a:ext uri="{909E8E84-426E-40DD-AFC4-6F175D3DCCD1}">
+                <a14:hiddenFill xmlns:a14="http://schemas.microsoft.com/office/drawing/2010/main">
+                  <a:solidFill>
+                    <a:srgbClr val="FFFFFF"/>
+                  </a:solidFill>
+                </a14:hiddenFill>
+              </a:ext>
+            </a:extLst>
+          </p:spPr>
+        </p:pic>
+        <p:sp>
+          <p:nvSpPr>
+            <p:cNvPr id="86" name="직사각형 85"/>
+            <p:cNvSpPr/>
+            <p:nvPr/>
+          </p:nvSpPr>
+          <p:spPr>
+            <a:xfrm>
+              <a:off x="4489413" y="3410802"/>
+              <a:ext cx="3122994" cy="1610112"/>
+            </a:xfrm>
+            <a:prstGeom prst="rect">
+              <a:avLst/>
+            </a:prstGeom>
+            <a:noFill/>
+          </p:spPr>
+          <p:style>
+            <a:lnRef idx="2">
+              <a:schemeClr val="accent1">
+                <a:shade val="50000"/>
+              </a:schemeClr>
+            </a:lnRef>
+            <a:fillRef idx="1">
+              <a:schemeClr val="accent1"/>
+            </a:fillRef>
+            <a:effectRef idx="0">
+              <a:schemeClr val="accent1"/>
+            </a:effectRef>
+            <a:fontRef idx="minor">
+              <a:schemeClr val="lt1"/>
+            </a:fontRef>
+          </p:style>
+          <p:txBody>
+            <a:bodyPr rtlCol="0" anchor="ctr"/>
+            <a:lstStyle/>
+            <a:p>
+              <a:pPr algn="ctr"/>
+              <a:endParaRPr lang="ko-KR" altLang="en-US"/>
+            </a:p>
+          </p:txBody>
+        </p:sp>
+        <p:pic>
+          <p:nvPicPr>
+            <p:cNvPr id="1047" name="그림 1046"/>
+            <p:cNvPicPr>
+              <a:picLocks noChangeAspect="1"/>
+            </p:cNvPicPr>
+            <p:nvPr/>
+          </p:nvPicPr>
+          <p:blipFill>
+            <a:blip r:embed="rId14"/>
+            <a:stretch>
+              <a:fillRect/>
+            </a:stretch>
+          </p:blipFill>
+          <p:spPr>
+            <a:xfrm>
+              <a:off x="4685773" y="3808487"/>
+              <a:ext cx="1633235" cy="774986"/>
+            </a:xfrm>
+            <a:prstGeom prst="rect">
+              <a:avLst/>
+            </a:prstGeom>
+          </p:spPr>
+        </p:pic>
+        <p:sp>
+          <p:nvSpPr>
+            <p:cNvPr id="1058" name="TextBox 1057"/>
+            <p:cNvSpPr txBox="1"/>
+            <p:nvPr/>
+          </p:nvSpPr>
+          <p:spPr>
+            <a:xfrm>
+              <a:off x="4577032" y="3052375"/>
+              <a:ext cx="2973076" cy="369332"/>
+            </a:xfrm>
+            <a:prstGeom prst="rect">
+              <a:avLst/>
+            </a:prstGeom>
+            <a:noFill/>
+          </p:spPr>
+          <p:txBody>
+            <a:bodyPr wrap="square" rtlCol="0">
+              <a:spAutoFit/>
+            </a:bodyPr>
+            <a:lstStyle/>
+            <a:p>
+              <a:r>
+                <a:rPr lang="en-US" altLang="ko-KR" dirty="0"/>
+                <a:t>h</a:t>
+              </a:r>
+              <a:r>
+                <a:rPr lang="en-US" altLang="ko-KR" dirty="0" smtClean="0"/>
+                <a:t>ttps://k02b2051.p.ssafy.io</a:t>
+              </a:r>
+              <a:endParaRPr lang="ko-KR" altLang="en-US" dirty="0"/>
+            </a:p>
+          </p:txBody>
+        </p:sp>
+      </p:grpSp>
+      <p:grpSp>
+        <p:nvGrpSpPr>
+          <p:cNvPr id="1060" name="그룹 1059"/>
+          <p:cNvGrpSpPr/>
+          <p:nvPr/>
+        </p:nvGrpSpPr>
+        <p:grpSpPr>
+          <a:xfrm>
+            <a:off x="8614079" y="4255737"/>
+            <a:ext cx="3122995" cy="1946833"/>
+            <a:chOff x="8614079" y="4255737"/>
+            <a:chExt cx="3122995" cy="1946833"/>
+          </a:xfrm>
+        </p:grpSpPr>
+        <p:grpSp>
+          <p:nvGrpSpPr>
+            <p:cNvPr id="35" name="그룹 34"/>
+            <p:cNvGrpSpPr/>
+            <p:nvPr/>
+          </p:nvGrpSpPr>
+          <p:grpSpPr>
+            <a:xfrm>
+              <a:off x="8614080" y="4592458"/>
+              <a:ext cx="3122994" cy="1610112"/>
+              <a:chOff x="4528039" y="4704963"/>
+              <a:chExt cx="1597026" cy="1610112"/>
+            </a:xfrm>
+          </p:grpSpPr>
+          <p:sp>
+            <p:nvSpPr>
+              <p:cNvPr id="12" name="직사각형 11"/>
+              <p:cNvSpPr/>
+              <p:nvPr/>
+            </p:nvSpPr>
+            <p:spPr>
+              <a:xfrm>
+                <a:off x="4528039" y="4704963"/>
+                <a:ext cx="1597026" cy="1610112"/>
+              </a:xfrm>
+              <a:prstGeom prst="rect">
+                <a:avLst/>
+              </a:prstGeom>
+              <a:noFill/>
+            </p:spPr>
+            <p:style>
+              <a:lnRef idx="2">
+                <a:schemeClr val="accent1">
+                  <a:shade val="50000"/>
+                </a:schemeClr>
+              </a:lnRef>
+              <a:fillRef idx="1">
+                <a:schemeClr val="accent1"/>
+              </a:fillRef>
+              <a:effectRef idx="0">
+                <a:schemeClr val="accent1"/>
+              </a:effectRef>
+              <a:fontRef idx="minor">
+                <a:schemeClr val="lt1"/>
+              </a:fontRef>
+            </p:style>
+            <p:txBody>
+              <a:bodyPr rtlCol="0" anchor="ctr"/>
+              <a:lstStyle/>
+              <a:p>
+                <a:pPr algn="ctr"/>
+                <a:endParaRPr lang="ko-KR" altLang="en-US"/>
+              </a:p>
+            </p:txBody>
+          </p:sp>
+          <p:pic>
+            <p:nvPicPr>
+              <p:cNvPr id="1038" name="Picture 14" descr="Vue.js - 위키백과, 우리 모두의 백과사전"/>
+              <p:cNvPicPr>
+                <a:picLocks noChangeAspect="1" noChangeArrowheads="1"/>
+              </p:cNvPicPr>
+              <p:nvPr/>
+            </p:nvPicPr>
+            <p:blipFill>
+              <a:blip r:embed="rId15">
+                <a:extLst>
+                  <a:ext uri="{28A0092B-C50C-407E-A947-70E740481C1C}">
+                    <a14:useLocalDpi xmlns:a14="http://schemas.microsoft.com/office/drawing/2010/main" val="0"/>
+                  </a:ext>
+                </a:extLst>
+              </a:blip>
+              <a:srcRect/>
+              <a:stretch>
+                <a:fillRect/>
+              </a:stretch>
+            </p:blipFill>
+            <p:spPr bwMode="auto">
+              <a:xfrm>
+                <a:off x="4702974" y="4878610"/>
+                <a:ext cx="563657" cy="1262817"/>
+              </a:xfrm>
+              <a:prstGeom prst="rect">
+                <a:avLst/>
+              </a:prstGeom>
+              <a:noFill/>
+              <a:extLst>
+                <a:ext uri="{909E8E84-426E-40DD-AFC4-6F175D3DCCD1}">
+                  <a14:hiddenFill xmlns:a14="http://schemas.microsoft.com/office/drawing/2010/main">
+                    <a:solidFill>
+                      <a:srgbClr val="FFFFFF"/>
+                    </a:solidFill>
+                  </a14:hiddenFill>
+                </a:ext>
+              </a:extLst>
+            </p:spPr>
+          </p:pic>
+        </p:grpSp>
+        <p:pic>
+          <p:nvPicPr>
+            <p:cNvPr id="1052" name="Picture 28" descr="Vuetify.js (@vuetifyjs) | Twitter"/>
+            <p:cNvPicPr>
+              <a:picLocks noChangeAspect="1" noChangeArrowheads="1"/>
+            </p:cNvPicPr>
+            <p:nvPr/>
+          </p:nvPicPr>
+          <p:blipFill rotWithShape="1">
+            <a:blip r:embed="rId16">
+              <a:extLst>
+                <a:ext uri="{28A0092B-C50C-407E-A947-70E740481C1C}">
+                  <a14:useLocalDpi xmlns:a14="http://schemas.microsoft.com/office/drawing/2010/main" val="0"/>
+                </a:ext>
+              </a:extLst>
+            </a:blip>
+            <a:srcRect t="10162"/>
+            <a:stretch/>
+          </p:blipFill>
+          <p:spPr bwMode="auto">
+            <a:xfrm>
+              <a:off x="10072766" y="4766104"/>
+              <a:ext cx="1592903" cy="1267907"/>
+            </a:xfrm>
+            <a:prstGeom prst="rect">
+              <a:avLst/>
+            </a:prstGeom>
+            <a:noFill/>
+            <a:extLst>
+              <a:ext uri="{909E8E84-426E-40DD-AFC4-6F175D3DCCD1}">
+                <a14:hiddenFill xmlns:a14="http://schemas.microsoft.com/office/drawing/2010/main">
+                  <a:solidFill>
+                    <a:srgbClr val="FFFFFF"/>
+                  </a:solidFill>
+                </a14:hiddenFill>
+              </a:ext>
+            </a:extLst>
+          </p:spPr>
+        </p:pic>
+        <p:sp>
+          <p:nvSpPr>
+            <p:cNvPr id="105" name="TextBox 104"/>
+            <p:cNvSpPr txBox="1"/>
+            <p:nvPr/>
+          </p:nvSpPr>
+          <p:spPr>
+            <a:xfrm>
+              <a:off x="8614079" y="4255737"/>
+              <a:ext cx="2973076" cy="369332"/>
+            </a:xfrm>
+            <a:prstGeom prst="rect">
+              <a:avLst/>
+            </a:prstGeom>
+            <a:noFill/>
+          </p:spPr>
+          <p:txBody>
+            <a:bodyPr wrap="square" rtlCol="0">
+              <a:spAutoFit/>
+            </a:bodyPr>
+            <a:lstStyle/>
+            <a:p>
+              <a:r>
+                <a:rPr lang="en-US" altLang="ko-KR" dirty="0" smtClean="0"/>
+                <a:t>front</a:t>
+              </a:r>
+              <a:endParaRPr lang="ko-KR" altLang="en-US" dirty="0"/>
+            </a:p>
+          </p:txBody>
+        </p:sp>
+      </p:grpSp>
+      <p:sp>
+        <p:nvSpPr>
+          <p:cNvPr id="106" name="TextBox 105"/>
+          <p:cNvSpPr txBox="1"/>
+          <p:nvPr/>
+        </p:nvSpPr>
+        <p:spPr>
+          <a:xfrm>
+            <a:off x="8602308" y="1244331"/>
+            <a:ext cx="690777" cy="369332"/>
+          </a:xfrm>
+          <a:prstGeom prst="rect">
+            <a:avLst/>
+          </a:prstGeom>
+          <a:noFill/>
+        </p:spPr>
+        <p:txBody>
+          <a:bodyPr wrap="square" rtlCol="0">
+            <a:spAutoFit/>
+          </a:bodyPr>
+          <a:lstStyle/>
+          <a:p>
+            <a:r>
+              <a:rPr lang="en-US" altLang="ko-KR" dirty="0" smtClean="0"/>
+              <a:t>WAS</a:t>
+            </a:r>
+            <a:endParaRPr lang="ko-KR" altLang="en-US" dirty="0"/>
+          </a:p>
+        </p:txBody>
+      </p:sp>
+      <p:sp>
+        <p:nvSpPr>
+          <p:cNvPr id="107" name="TextBox 106"/>
+          <p:cNvSpPr txBox="1"/>
+          <p:nvPr/>
+        </p:nvSpPr>
+        <p:spPr>
+          <a:xfrm>
+            <a:off x="4235885" y="126844"/>
+            <a:ext cx="2973076" cy="369332"/>
+          </a:xfrm>
+          <a:prstGeom prst="rect">
+            <a:avLst/>
+          </a:prstGeom>
+          <a:noFill/>
+        </p:spPr>
+        <p:txBody>
+          <a:bodyPr wrap="square" rtlCol="0">
+            <a:spAutoFit/>
+          </a:bodyPr>
+          <a:lstStyle/>
+          <a:p>
+            <a:r>
+              <a:rPr lang="en-US" altLang="ko-KR" dirty="0" smtClean="0"/>
+              <a:t>android</a:t>
+            </a:r>
+            <a:endParaRPr lang="ko-KR" altLang="en-US" dirty="0"/>
+          </a:p>
+        </p:txBody>
+      </p:sp>
+      <p:sp>
+        <p:nvSpPr>
+          <p:cNvPr id="113" name="TextBox 112"/>
+          <p:cNvSpPr txBox="1"/>
+          <p:nvPr/>
+        </p:nvSpPr>
+        <p:spPr>
+          <a:xfrm>
+            <a:off x="7714604" y="3328856"/>
+            <a:ext cx="709870" cy="369332"/>
+          </a:xfrm>
+          <a:prstGeom prst="rect">
+            <a:avLst/>
+          </a:prstGeom>
+          <a:noFill/>
+        </p:spPr>
+        <p:txBody>
+          <a:bodyPr wrap="square" rtlCol="0">
+            <a:spAutoFit/>
+          </a:bodyPr>
+          <a:lstStyle/>
+          <a:p>
+            <a:r>
+              <a:rPr lang="en-US" altLang="ko-KR" dirty="0" smtClean="0"/>
+              <a:t>/</a:t>
+            </a:r>
+            <a:r>
+              <a:rPr lang="en-US" altLang="ko-KR" dirty="0" err="1" smtClean="0"/>
+              <a:t>api</a:t>
+            </a:r>
+            <a:r>
+              <a:rPr lang="en-US" altLang="ko-KR" dirty="0" smtClean="0"/>
+              <a:t>/</a:t>
+            </a:r>
+            <a:endParaRPr lang="ko-KR" altLang="en-US" dirty="0"/>
+          </a:p>
+        </p:txBody>
+      </p:sp>
+      <p:sp>
+        <p:nvSpPr>
+          <p:cNvPr id="114" name="TextBox 113"/>
+          <p:cNvSpPr txBox="1"/>
+          <p:nvPr/>
+        </p:nvSpPr>
+        <p:spPr>
+          <a:xfrm>
+            <a:off x="8045262" y="4766104"/>
+            <a:ext cx="379212" cy="369332"/>
+          </a:xfrm>
+          <a:prstGeom prst="rect">
+            <a:avLst/>
+          </a:prstGeom>
+          <a:noFill/>
+        </p:spPr>
+        <p:txBody>
+          <a:bodyPr wrap="square" rtlCol="0">
+            <a:spAutoFit/>
+          </a:bodyPr>
+          <a:lstStyle/>
+          <a:p>
+            <a:r>
+              <a:rPr lang="en-US" altLang="ko-KR" dirty="0" smtClean="0"/>
+              <a:t>/</a:t>
+            </a:r>
+            <a:endParaRPr lang="ko-KR" altLang="en-US" dirty="0"/>
+          </a:p>
+        </p:txBody>
+      </p:sp>
+      <p:cxnSp>
+        <p:nvCxnSpPr>
+          <p:cNvPr id="121" name="직선 화살표 연결선 120"/>
+          <p:cNvCxnSpPr>
+            <a:stCxn id="1058" idx="0"/>
+            <a:endCxn id="10" idx="2"/>
+          </p:cNvCxnSpPr>
+          <p:nvPr/>
+        </p:nvCxnSpPr>
+        <p:spPr>
+          <a:xfrm flipV="1">
+            <a:off x="6033749" y="2300525"/>
+            <a:ext cx="1368" cy="1417768"/>
+          </a:xfrm>
+          <a:prstGeom prst="straightConnector1">
+            <a:avLst/>
+          </a:prstGeom>
+          <a:ln w="19050">
+            <a:solidFill>
+              <a:schemeClr val="tx1"/>
+            </a:solidFill>
+            <a:headEnd type="triangle"/>
+            <a:tailEnd type="triangle"/>
+          </a:ln>
+        </p:spPr>
+        <p:style>
+          <a:lnRef idx="1">
+            <a:schemeClr val="accent1"/>
+          </a:lnRef>
+          <a:fillRef idx="0">
+            <a:schemeClr val="accent1"/>
+          </a:fillRef>
+          <a:effectRef idx="0">
+            <a:schemeClr val="accent1"/>
+          </a:effectRef>
+          <a:fontRef idx="minor">
+            <a:schemeClr val="tx1"/>
+          </a:fontRef>
+        </p:style>
+      </p:cxnSp>
     </p:spTree>
     <p:extLst>
       <p:ext uri="{BB962C8B-B14F-4D97-AF65-F5344CB8AC3E}">
@@ -4184,4 +5085,265 @@
     </a:ext>
   </a:extLst>
 </a:theme>
+</file>
+
+<file path=ppt/theme/theme2.xml><?xml version="1.0" encoding="utf-8"?>
+<a:theme xmlns:a="http://schemas.openxmlformats.org/drawingml/2006/main" name="Office 테마">
+  <a:themeElements>
+    <a:clrScheme name="Office">
+      <a:dk1>
+        <a:sysClr val="windowText" lastClr="000000"/>
+      </a:dk1>
+      <a:lt1>
+        <a:sysClr val="window" lastClr="FFFFFF"/>
+      </a:lt1>
+      <a:dk2>
+        <a:srgbClr val="44546A"/>
+      </a:dk2>
+      <a:lt2>
+        <a:srgbClr val="E7E6E6"/>
+      </a:lt2>
+      <a:accent1>
+        <a:srgbClr val="5B9BD5"/>
+      </a:accent1>
+      <a:accent2>
+        <a:srgbClr val="ED7D31"/>
+      </a:accent2>
+      <a:accent3>
+        <a:srgbClr val="A5A5A5"/>
+      </a:accent3>
+      <a:accent4>
+        <a:srgbClr val="FFC000"/>
+      </a:accent4>
+      <a:accent5>
+        <a:srgbClr val="4472C4"/>
+      </a:accent5>
+      <a:accent6>
+        <a:srgbClr val="70AD47"/>
+      </a:accent6>
+      <a:hlink>
+        <a:srgbClr val="0563C1"/>
+      </a:hlink>
+      <a:folHlink>
+        <a:srgbClr val="954F72"/>
+      </a:folHlink>
+    </a:clrScheme>
+    <a:fontScheme name="Office">
+      <a:majorFont>
+        <a:latin typeface="맑은 고딕" panose="020F0302020204030204"/>
+        <a:ea typeface=""/>
+        <a:cs typeface=""/>
+        <a:font script="Jpan" typeface="游ゴシック Light"/>
+        <a:font script="Hang" typeface="맑은 고딕"/>
+        <a:font script="Hans" typeface="等线 Light"/>
+        <a:font script="Hant" typeface="新細明體"/>
+        <a:font script="Arab" typeface="Times New Roman"/>
+        <a:font script="Hebr" typeface="Times New Roman"/>
+        <a:font script="Thai" typeface="Angsana New"/>
+        <a:font script="Ethi" typeface="Nyala"/>
+        <a:font script="Beng" typeface="Vrinda"/>
+        <a:font script="Gujr" typeface="Shruti"/>
+        <a:font script="Khmr" typeface="MoolBoran"/>
+        <a:font script="Knda" typeface="Tunga"/>
+        <a:font script="Guru" typeface="Raavi"/>
+        <a:font script="Cans" typeface="Euphemia"/>
+        <a:font script="Cher" typeface="Plantagenet Cherokee"/>
+        <a:font script="Yiii" typeface="Microsoft Yi Baiti"/>
+        <a:font script="Tibt" typeface="Microsoft Himalaya"/>
+        <a:font script="Thaa" typeface="MV Boli"/>
+        <a:font script="Deva" typeface="Mangal"/>
+        <a:font script="Telu" typeface="Gautami"/>
+        <a:font script="Taml" typeface="Latha"/>
+        <a:font script="Syrc" typeface="Estrangelo Edessa"/>
+        <a:font script="Orya" typeface="Kalinga"/>
+        <a:font script="Mlym" typeface="Kartika"/>
+        <a:font script="Laoo" typeface="DokChampa"/>
+        <a:font script="Sinh" typeface="Iskoola Pota"/>
+        <a:font script="Mong" typeface="Mongolian Baiti"/>
+        <a:font script="Viet" typeface="Times New Roman"/>
+        <a:font script="Uigh" typeface="Microsoft Uighur"/>
+        <a:font script="Geor" typeface="Sylfaen"/>
+      </a:majorFont>
+      <a:minorFont>
+        <a:latin typeface="맑은 고딕" panose="020F0502020204030204"/>
+        <a:ea typeface=""/>
+        <a:cs typeface=""/>
+        <a:font script="Jpan" typeface="游ゴシック"/>
+        <a:font script="Hang" typeface="맑은 고딕"/>
+        <a:font script="Hans" typeface="等线"/>
+        <a:font script="Hant" typeface="新細明體"/>
+        <a:font script="Arab" typeface="Arial"/>
+        <a:font script="Hebr" typeface="Arial"/>
+        <a:font script="Thai" typeface="Cordia New"/>
+        <a:font script="Ethi" typeface="Nyala"/>
+        <a:font script="Beng" typeface="Vrinda"/>
+        <a:font script="Gujr" typeface="Shruti"/>
+        <a:font script="Khmr" typeface="DaunPenh"/>
+        <a:font script="Knda" typeface="Tunga"/>
+        <a:font script="Guru" typeface="Raavi"/>
+        <a:font script="Cans" typeface="Euphemia"/>
+        <a:font script="Cher" typeface="Plantagenet Cherokee"/>
+        <a:font script="Yiii" typeface="Microsoft Yi Baiti"/>
+        <a:font script="Tibt" typeface="Microsoft Himalaya"/>
+        <a:font script="Thaa" typeface="MV Boli"/>
+        <a:font script="Deva" typeface="Mangal"/>
+        <a:font script="Telu" typeface="Gautami"/>
+        <a:font script="Taml" typeface="Latha"/>
+        <a:font script="Syrc" typeface="Estrangelo Edessa"/>
+        <a:font script="Orya" typeface="Kalinga"/>
+        <a:font script="Mlym" typeface="Kartika"/>
+        <a:font script="Laoo" typeface="DokChampa"/>
+        <a:font script="Sinh" typeface="Iskoola Pota"/>
+        <a:font script="Mong" typeface="Mongolian Baiti"/>
+        <a:font script="Viet" typeface="Arial"/>
+        <a:font script="Uigh" typeface="Microsoft Uighur"/>
+        <a:font script="Geor" typeface="Sylfaen"/>
+      </a:minorFont>
+    </a:fontScheme>
+    <a:fmtScheme name="Office">
+      <a:fillStyleLst>
+        <a:solidFill>
+          <a:schemeClr val="phClr"/>
+        </a:solidFill>
+        <a:gradFill rotWithShape="1">
+          <a:gsLst>
+            <a:gs pos="0">
+              <a:schemeClr val="phClr">
+                <a:lumMod val="110000"/>
+                <a:satMod val="105000"/>
+                <a:tint val="67000"/>
+              </a:schemeClr>
+            </a:gs>
+            <a:gs pos="50000">
+              <a:schemeClr val="phClr">
+                <a:lumMod val="105000"/>
+                <a:satMod val="103000"/>
+                <a:tint val="73000"/>
+              </a:schemeClr>
+            </a:gs>
+            <a:gs pos="100000">
+              <a:schemeClr val="phClr">
+                <a:lumMod val="105000"/>
+                <a:satMod val="109000"/>
+                <a:tint val="81000"/>
+              </a:schemeClr>
+            </a:gs>
+          </a:gsLst>
+          <a:lin ang="5400000" scaled="0"/>
+        </a:gradFill>
+        <a:gradFill rotWithShape="1">
+          <a:gsLst>
+            <a:gs pos="0">
+              <a:schemeClr val="phClr">
+                <a:satMod val="103000"/>
+                <a:lumMod val="102000"/>
+                <a:tint val="94000"/>
+              </a:schemeClr>
+            </a:gs>
+            <a:gs pos="50000">
+              <a:schemeClr val="phClr">
+                <a:satMod val="110000"/>
+                <a:lumMod val="100000"/>
+                <a:shade val="100000"/>
+              </a:schemeClr>
+            </a:gs>
+            <a:gs pos="100000">
+              <a:schemeClr val="phClr">
+                <a:lumMod val="99000"/>
+                <a:satMod val="120000"/>
+                <a:shade val="78000"/>
+              </a:schemeClr>
+            </a:gs>
+          </a:gsLst>
+          <a:lin ang="5400000" scaled="0"/>
+        </a:gradFill>
+      </a:fillStyleLst>
+      <a:lnStyleLst>
+        <a:ln w="6350" cap="flat" cmpd="sng" algn="ctr">
+          <a:solidFill>
+            <a:schemeClr val="phClr"/>
+          </a:solidFill>
+          <a:prstDash val="solid"/>
+          <a:miter lim="800000"/>
+        </a:ln>
+        <a:ln w="12700" cap="flat" cmpd="sng" algn="ctr">
+          <a:solidFill>
+            <a:schemeClr val="phClr"/>
+          </a:solidFill>
+          <a:prstDash val="solid"/>
+          <a:miter lim="800000"/>
+        </a:ln>
+        <a:ln w="19050" cap="flat" cmpd="sng" algn="ctr">
+          <a:solidFill>
+            <a:schemeClr val="phClr"/>
+          </a:solidFill>
+          <a:prstDash val="solid"/>
+          <a:miter lim="800000"/>
+        </a:ln>
+      </a:lnStyleLst>
+      <a:effectStyleLst>
+        <a:effectStyle>
+          <a:effectLst/>
+        </a:effectStyle>
+        <a:effectStyle>
+          <a:effectLst/>
+        </a:effectStyle>
+        <a:effectStyle>
+          <a:effectLst>
+            <a:outerShdw blurRad="57150" dist="19050" dir="5400000" algn="ctr" rotWithShape="0">
+              <a:srgbClr val="000000">
+                <a:alpha val="63000"/>
+              </a:srgbClr>
+            </a:outerShdw>
+          </a:effectLst>
+        </a:effectStyle>
+      </a:effectStyleLst>
+      <a:bgFillStyleLst>
+        <a:solidFill>
+          <a:schemeClr val="phClr"/>
+        </a:solidFill>
+        <a:solidFill>
+          <a:schemeClr val="phClr">
+            <a:tint val="95000"/>
+            <a:satMod val="170000"/>
+          </a:schemeClr>
+        </a:solidFill>
+        <a:gradFill rotWithShape="1">
+          <a:gsLst>
+            <a:gs pos="0">
+              <a:schemeClr val="phClr">
+                <a:tint val="93000"/>
+                <a:satMod val="150000"/>
+                <a:shade val="98000"/>
+                <a:lumMod val="102000"/>
+              </a:schemeClr>
+            </a:gs>
+            <a:gs pos="50000">
+              <a:schemeClr val="phClr">
+                <a:tint val="98000"/>
+                <a:satMod val="130000"/>
+                <a:shade val="90000"/>
+                <a:lumMod val="103000"/>
+              </a:schemeClr>
+            </a:gs>
+            <a:gs pos="100000">
+              <a:schemeClr val="phClr">
+                <a:shade val="63000"/>
+                <a:satMod val="120000"/>
+              </a:schemeClr>
+            </a:gs>
+          </a:gsLst>
+          <a:lin ang="5400000" scaled="0"/>
+        </a:gradFill>
+      </a:bgFillStyleLst>
+    </a:fmtScheme>
+  </a:themeElements>
+  <a:objectDefaults/>
+  <a:extraClrSchemeLst/>
+  <a:extLst>
+    <a:ext uri="{05A4C25C-085E-4340-85A3-A5531E510DB2}">
+      <thm15:themeFamily xmlns:thm15="http://schemas.microsoft.com/office/thememl/2012/main" name="Office Theme" id="{62F939B6-93AF-4DB8-9C6B-D6C7DFDC589F}" vid="{4A3C46E8-61CC-4603-A589-7422A47A8E4A}"/>
+    </a:ext>
+  </a:extLst>
+</a:theme>
 </file>
</xml_diff>